<commit_message>
added a new file
</commit_message>
<xml_diff>
--- a/GPREC/02_Motion/Kit2_Motion_Training.pptx
+++ b/GPREC/02_Motion/Kit2_Motion_Training.pptx
@@ -1765,7 +1765,7 @@
           <a:p>
             <a:fld id="{A5593103-930B-4864-A0CC-E5CD95E9581E}" type="datetimeFigureOut">
               <a:rPr lang="en-GB" smtClean="0"/>
-              <a:t>19/11/2025</a:t>
+              <a:t>24/11/2025</a:t>
             </a:fld>
             <a:endParaRPr lang="en-GB"/>
           </a:p>
@@ -1965,7 +1965,7 @@
           <a:p>
             <a:fld id="{A5593103-930B-4864-A0CC-E5CD95E9581E}" type="datetimeFigureOut">
               <a:rPr lang="en-GB" smtClean="0"/>
-              <a:t>19/11/2025</a:t>
+              <a:t>24/11/2025</a:t>
             </a:fld>
             <a:endParaRPr lang="en-GB"/>
           </a:p>
@@ -2175,7 +2175,7 @@
           <a:p>
             <a:fld id="{A5593103-930B-4864-A0CC-E5CD95E9581E}" type="datetimeFigureOut">
               <a:rPr lang="en-GB" smtClean="0"/>
-              <a:t>19/11/2025</a:t>
+              <a:t>24/11/2025</a:t>
             </a:fld>
             <a:endParaRPr lang="en-GB"/>
           </a:p>
@@ -2397,7 +2397,7 @@
           <a:p>
             <a:fld id="{A1D51BA1-F58B-40DF-9C13-73BC69DE2A80}" type="datetimeFigureOut">
               <a:rPr lang="en-GB" smtClean="0"/>
-              <a:t>19/11/2025</a:t>
+              <a:t>24/11/2025</a:t>
             </a:fld>
             <a:endParaRPr lang="en-GB"/>
           </a:p>
@@ -2597,7 +2597,7 @@
           <a:p>
             <a:fld id="{A1D51BA1-F58B-40DF-9C13-73BC69DE2A80}" type="datetimeFigureOut">
               <a:rPr lang="en-GB" smtClean="0"/>
-              <a:t>19/11/2025</a:t>
+              <a:t>24/11/2025</a:t>
             </a:fld>
             <a:endParaRPr lang="en-GB"/>
           </a:p>
@@ -2873,7 +2873,7 @@
           <a:p>
             <a:fld id="{A1D51BA1-F58B-40DF-9C13-73BC69DE2A80}" type="datetimeFigureOut">
               <a:rPr lang="en-GB" smtClean="0"/>
-              <a:t>19/11/2025</a:t>
+              <a:t>24/11/2025</a:t>
             </a:fld>
             <a:endParaRPr lang="en-GB"/>
           </a:p>
@@ -3141,7 +3141,7 @@
           <a:p>
             <a:fld id="{A1D51BA1-F58B-40DF-9C13-73BC69DE2A80}" type="datetimeFigureOut">
               <a:rPr lang="en-GB" smtClean="0"/>
-              <a:t>19/11/2025</a:t>
+              <a:t>24/11/2025</a:t>
             </a:fld>
             <a:endParaRPr lang="en-GB"/>
           </a:p>
@@ -3556,7 +3556,7 @@
           <a:p>
             <a:fld id="{A1D51BA1-F58B-40DF-9C13-73BC69DE2A80}" type="datetimeFigureOut">
               <a:rPr lang="en-GB" smtClean="0"/>
-              <a:t>19/11/2025</a:t>
+              <a:t>24/11/2025</a:t>
             </a:fld>
             <a:endParaRPr lang="en-GB"/>
           </a:p>
@@ -3698,7 +3698,7 @@
           <a:p>
             <a:fld id="{A1D51BA1-F58B-40DF-9C13-73BC69DE2A80}" type="datetimeFigureOut">
               <a:rPr lang="en-GB" smtClean="0"/>
-              <a:t>19/11/2025</a:t>
+              <a:t>24/11/2025</a:t>
             </a:fld>
             <a:endParaRPr lang="en-GB"/>
           </a:p>
@@ -3811,7 +3811,7 @@
           <a:p>
             <a:fld id="{A1D51BA1-F58B-40DF-9C13-73BC69DE2A80}" type="datetimeFigureOut">
               <a:rPr lang="en-GB" smtClean="0"/>
-              <a:t>19/11/2025</a:t>
+              <a:t>24/11/2025</a:t>
             </a:fld>
             <a:endParaRPr lang="en-GB"/>
           </a:p>
@@ -4124,7 +4124,7 @@
           <a:p>
             <a:fld id="{A1D51BA1-F58B-40DF-9C13-73BC69DE2A80}" type="datetimeFigureOut">
               <a:rPr lang="en-GB" smtClean="0"/>
-              <a:t>19/11/2025</a:t>
+              <a:t>24/11/2025</a:t>
             </a:fld>
             <a:endParaRPr lang="en-GB"/>
           </a:p>
@@ -4324,7 +4324,7 @@
           <a:p>
             <a:fld id="{A5593103-930B-4864-A0CC-E5CD95E9581E}" type="datetimeFigureOut">
               <a:rPr lang="en-GB" smtClean="0"/>
-              <a:t>19/11/2025</a:t>
+              <a:t>24/11/2025</a:t>
             </a:fld>
             <a:endParaRPr lang="en-GB"/>
           </a:p>
@@ -4613,7 +4613,7 @@
           <a:p>
             <a:fld id="{A1D51BA1-F58B-40DF-9C13-73BC69DE2A80}" type="datetimeFigureOut">
               <a:rPr lang="en-GB" smtClean="0"/>
-              <a:t>19/11/2025</a:t>
+              <a:t>24/11/2025</a:t>
             </a:fld>
             <a:endParaRPr lang="en-GB"/>
           </a:p>
@@ -4813,7 +4813,7 @@
           <a:p>
             <a:fld id="{A1D51BA1-F58B-40DF-9C13-73BC69DE2A80}" type="datetimeFigureOut">
               <a:rPr lang="en-GB" smtClean="0"/>
-              <a:t>19/11/2025</a:t>
+              <a:t>24/11/2025</a:t>
             </a:fld>
             <a:endParaRPr lang="en-GB"/>
           </a:p>
@@ -5023,7 +5023,7 @@
           <a:p>
             <a:fld id="{A1D51BA1-F58B-40DF-9C13-73BC69DE2A80}" type="datetimeFigureOut">
               <a:rPr lang="en-GB" smtClean="0"/>
-              <a:t>19/11/2025</a:t>
+              <a:t>24/11/2025</a:t>
             </a:fld>
             <a:endParaRPr lang="en-GB"/>
           </a:p>
@@ -5299,7 +5299,7 @@
           <a:p>
             <a:fld id="{A5593103-930B-4864-A0CC-E5CD95E9581E}" type="datetimeFigureOut">
               <a:rPr lang="en-GB" smtClean="0"/>
-              <a:t>19/11/2025</a:t>
+              <a:t>24/11/2025</a:t>
             </a:fld>
             <a:endParaRPr lang="en-GB"/>
           </a:p>
@@ -5567,7 +5567,7 @@
           <a:p>
             <a:fld id="{A5593103-930B-4864-A0CC-E5CD95E9581E}" type="datetimeFigureOut">
               <a:rPr lang="en-GB" smtClean="0"/>
-              <a:t>19/11/2025</a:t>
+              <a:t>24/11/2025</a:t>
             </a:fld>
             <a:endParaRPr lang="en-GB"/>
           </a:p>
@@ -5982,7 +5982,7 @@
           <a:p>
             <a:fld id="{A5593103-930B-4864-A0CC-E5CD95E9581E}" type="datetimeFigureOut">
               <a:rPr lang="en-GB" smtClean="0"/>
-              <a:t>19/11/2025</a:t>
+              <a:t>24/11/2025</a:t>
             </a:fld>
             <a:endParaRPr lang="en-GB"/>
           </a:p>
@@ -6124,7 +6124,7 @@
           <a:p>
             <a:fld id="{A5593103-930B-4864-A0CC-E5CD95E9581E}" type="datetimeFigureOut">
               <a:rPr lang="en-GB" smtClean="0"/>
-              <a:t>19/11/2025</a:t>
+              <a:t>24/11/2025</a:t>
             </a:fld>
             <a:endParaRPr lang="en-GB"/>
           </a:p>
@@ -6237,7 +6237,7 @@
           <a:p>
             <a:fld id="{A5593103-930B-4864-A0CC-E5CD95E9581E}" type="datetimeFigureOut">
               <a:rPr lang="en-GB" smtClean="0"/>
-              <a:t>19/11/2025</a:t>
+              <a:t>24/11/2025</a:t>
             </a:fld>
             <a:endParaRPr lang="en-GB"/>
           </a:p>
@@ -6550,7 +6550,7 @@
           <a:p>
             <a:fld id="{A5593103-930B-4864-A0CC-E5CD95E9581E}" type="datetimeFigureOut">
               <a:rPr lang="en-GB" smtClean="0"/>
-              <a:t>19/11/2025</a:t>
+              <a:t>24/11/2025</a:t>
             </a:fld>
             <a:endParaRPr lang="en-GB"/>
           </a:p>
@@ -6839,7 +6839,7 @@
           <a:p>
             <a:fld id="{A5593103-930B-4864-A0CC-E5CD95E9581E}" type="datetimeFigureOut">
               <a:rPr lang="en-GB" smtClean="0"/>
-              <a:t>19/11/2025</a:t>
+              <a:t>24/11/2025</a:t>
             </a:fld>
             <a:endParaRPr lang="en-GB"/>
           </a:p>
@@ -7082,7 +7082,7 @@
           <a:p>
             <a:fld id="{A5593103-930B-4864-A0CC-E5CD95E9581E}" type="datetimeFigureOut">
               <a:rPr lang="en-GB" smtClean="0"/>
-              <a:t>19/11/2025</a:t>
+              <a:t>24/11/2025</a:t>
             </a:fld>
             <a:endParaRPr lang="en-GB"/>
           </a:p>
@@ -7652,7 +7652,7 @@
           <a:p>
             <a:fld id="{A1D51BA1-F58B-40DF-9C13-73BC69DE2A80}" type="datetimeFigureOut">
               <a:rPr lang="en-GB" smtClean="0"/>
-              <a:t>19/11/2025</a:t>
+              <a:t>24/11/2025</a:t>
             </a:fld>
             <a:endParaRPr lang="en-GB"/>
           </a:p>
@@ -14076,8 +14076,8 @@
             <a:chExt cx="1604880" cy="474480"/>
           </a:xfrm>
         </p:grpSpPr>
-        <mc:AlternateContent xmlns:mc="http://schemas.openxmlformats.org/markup-compatibility/2006">
-          <mc:Choice xmlns:p14="http://schemas.microsoft.com/office/powerpoint/2010/main" Requires="p14">
+        <mc:AlternateContent xmlns:mc="http://schemas.openxmlformats.org/markup-compatibility/2006" xmlns:p14="http://schemas.microsoft.com/office/powerpoint/2010/main">
+          <mc:Choice Requires="p14">
             <p:contentPart p14:bwMode="auto" r:id="rId57">
               <p14:nvContentPartPr>
                 <p14:cNvPr id="16" name="Ink 15">
@@ -14096,7 +14096,7 @@
               </p14:xfrm>
             </p:contentPart>
           </mc:Choice>
-          <mc:Fallback>
+          <mc:Fallback xmlns="">
             <p:pic>
               <p:nvPicPr>
                 <p:cNvPr id="16" name="Ink 15">
@@ -14127,8 +14127,8 @@
             </p:pic>
           </mc:Fallback>
         </mc:AlternateContent>
-        <mc:AlternateContent xmlns:mc="http://schemas.openxmlformats.org/markup-compatibility/2006">
-          <mc:Choice xmlns:p14="http://schemas.microsoft.com/office/powerpoint/2010/main" Requires="p14">
+        <mc:AlternateContent xmlns:mc="http://schemas.openxmlformats.org/markup-compatibility/2006" xmlns:p14="http://schemas.microsoft.com/office/powerpoint/2010/main">
+          <mc:Choice Requires="p14">
             <p:contentPart p14:bwMode="auto" r:id="rId59">
               <p14:nvContentPartPr>
                 <p14:cNvPr id="17" name="Ink 16">
@@ -14147,7 +14147,7 @@
               </p14:xfrm>
             </p:contentPart>
           </mc:Choice>
-          <mc:Fallback>
+          <mc:Fallback xmlns="">
             <p:pic>
               <p:nvPicPr>
                 <p:cNvPr id="17" name="Ink 16">
@@ -14199,8 +14199,8 @@
             <a:chExt cx="2307600" cy="776160"/>
           </a:xfrm>
         </p:grpSpPr>
-        <mc:AlternateContent xmlns:mc="http://schemas.openxmlformats.org/markup-compatibility/2006">
-          <mc:Choice xmlns:p14="http://schemas.microsoft.com/office/powerpoint/2010/main" Requires="p14">
+        <mc:AlternateContent xmlns:mc="http://schemas.openxmlformats.org/markup-compatibility/2006" xmlns:p14="http://schemas.microsoft.com/office/powerpoint/2010/main">
+          <mc:Choice Requires="p14">
             <p:contentPart p14:bwMode="auto" r:id="rId61">
               <p14:nvContentPartPr>
                 <p14:cNvPr id="19" name="Ink 18">
@@ -14219,7 +14219,7 @@
               </p14:xfrm>
             </p:contentPart>
           </mc:Choice>
-          <mc:Fallback>
+          <mc:Fallback xmlns="">
             <p:pic>
               <p:nvPicPr>
                 <p:cNvPr id="19" name="Ink 18">
@@ -14250,8 +14250,8 @@
             </p:pic>
           </mc:Fallback>
         </mc:AlternateContent>
-        <mc:AlternateContent xmlns:mc="http://schemas.openxmlformats.org/markup-compatibility/2006">
-          <mc:Choice xmlns:p14="http://schemas.microsoft.com/office/powerpoint/2010/main" Requires="p14">
+        <mc:AlternateContent xmlns:mc="http://schemas.openxmlformats.org/markup-compatibility/2006" xmlns:p14="http://schemas.microsoft.com/office/powerpoint/2010/main">
+          <mc:Choice Requires="p14">
             <p:contentPart p14:bwMode="auto" r:id="rId63">
               <p14:nvContentPartPr>
                 <p14:cNvPr id="20" name="Ink 19">
@@ -14270,7 +14270,7 @@
               </p14:xfrm>
             </p:contentPart>
           </mc:Choice>
-          <mc:Fallback>
+          <mc:Fallback xmlns="">
             <p:pic>
               <p:nvPicPr>
                 <p:cNvPr id="20" name="Ink 19">
@@ -14301,8 +14301,8 @@
             </p:pic>
           </mc:Fallback>
         </mc:AlternateContent>
-        <mc:AlternateContent xmlns:mc="http://schemas.openxmlformats.org/markup-compatibility/2006">
-          <mc:Choice xmlns:p14="http://schemas.microsoft.com/office/powerpoint/2010/main" Requires="p14">
+        <mc:AlternateContent xmlns:mc="http://schemas.openxmlformats.org/markup-compatibility/2006" xmlns:p14="http://schemas.microsoft.com/office/powerpoint/2010/main">
+          <mc:Choice Requires="p14">
             <p:contentPart p14:bwMode="auto" r:id="rId65">
               <p14:nvContentPartPr>
                 <p14:cNvPr id="22" name="Ink 21">
@@ -14321,7 +14321,7 @@
               </p14:xfrm>
             </p:contentPart>
           </mc:Choice>
-          <mc:Fallback>
+          <mc:Fallback xmlns="">
             <p:pic>
               <p:nvPicPr>
                 <p:cNvPr id="22" name="Ink 21">
@@ -14352,8 +14352,8 @@
             </p:pic>
           </mc:Fallback>
         </mc:AlternateContent>
-        <mc:AlternateContent xmlns:mc="http://schemas.openxmlformats.org/markup-compatibility/2006">
-          <mc:Choice xmlns:p14="http://schemas.microsoft.com/office/powerpoint/2010/main" Requires="p14">
+        <mc:AlternateContent xmlns:mc="http://schemas.openxmlformats.org/markup-compatibility/2006" xmlns:p14="http://schemas.microsoft.com/office/powerpoint/2010/main">
+          <mc:Choice Requires="p14">
             <p:contentPart p14:bwMode="auto" r:id="rId67">
               <p14:nvContentPartPr>
                 <p14:cNvPr id="23" name="Ink 22">
@@ -14372,7 +14372,7 @@
               </p14:xfrm>
             </p:contentPart>
           </mc:Choice>
-          <mc:Fallback>
+          <mc:Fallback xmlns="">
             <p:pic>
               <p:nvPicPr>
                 <p:cNvPr id="23" name="Ink 22">
@@ -14404,8 +14404,8 @@
           </mc:Fallback>
         </mc:AlternateContent>
       </p:grpSp>
-      <mc:AlternateContent xmlns:mc="http://schemas.openxmlformats.org/markup-compatibility/2006">
-        <mc:Choice xmlns:p14="http://schemas.microsoft.com/office/powerpoint/2010/main" Requires="p14">
+      <mc:AlternateContent xmlns:mc="http://schemas.openxmlformats.org/markup-compatibility/2006" xmlns:p14="http://schemas.microsoft.com/office/powerpoint/2010/main">
+        <mc:Choice Requires="p14">
           <p:contentPart p14:bwMode="auto" r:id="rId69">
             <p14:nvContentPartPr>
               <p14:cNvPr id="57" name="Ink 56">
@@ -14424,7 +14424,7 @@
             </p14:xfrm>
           </p:contentPart>
         </mc:Choice>
-        <mc:Fallback>
+        <mc:Fallback xmlns="">
           <p:pic>
             <p:nvPicPr>
               <p:cNvPr id="57" name="Ink 56">
@@ -14455,8 +14455,8 @@
           </p:pic>
         </mc:Fallback>
       </mc:AlternateContent>
-      <mc:AlternateContent xmlns:mc="http://schemas.openxmlformats.org/markup-compatibility/2006">
-        <mc:Choice xmlns:p14="http://schemas.microsoft.com/office/powerpoint/2010/main" Requires="p14">
+      <mc:AlternateContent xmlns:mc="http://schemas.openxmlformats.org/markup-compatibility/2006" xmlns:p14="http://schemas.microsoft.com/office/powerpoint/2010/main">
+        <mc:Choice Requires="p14">
           <p:contentPart p14:bwMode="auto" r:id="rId71">
             <p14:nvContentPartPr>
               <p14:cNvPr id="74" name="Ink 73">
@@ -14475,7 +14475,7 @@
             </p14:xfrm>
           </p:contentPart>
         </mc:Choice>
-        <mc:Fallback>
+        <mc:Fallback xmlns="">
           <p:pic>
             <p:nvPicPr>
               <p:cNvPr id="74" name="Ink 73">
@@ -14506,8 +14506,8 @@
           </p:pic>
         </mc:Fallback>
       </mc:AlternateContent>
-      <mc:AlternateContent xmlns:mc="http://schemas.openxmlformats.org/markup-compatibility/2006">
-        <mc:Choice xmlns:p14="http://schemas.microsoft.com/office/powerpoint/2010/main" Requires="p14">
+      <mc:AlternateContent xmlns:mc="http://schemas.openxmlformats.org/markup-compatibility/2006" xmlns:p14="http://schemas.microsoft.com/office/powerpoint/2010/main">
+        <mc:Choice Requires="p14">
           <p:contentPart p14:bwMode="auto" r:id="rId73">
             <p14:nvContentPartPr>
               <p14:cNvPr id="75" name="Ink 74">
@@ -14526,7 +14526,7 @@
             </p14:xfrm>
           </p:contentPart>
         </mc:Choice>
-        <mc:Fallback>
+        <mc:Fallback xmlns="">
           <p:pic>
             <p:nvPicPr>
               <p:cNvPr id="75" name="Ink 74">
@@ -14557,8 +14557,8 @@
           </p:pic>
         </mc:Fallback>
       </mc:AlternateContent>
-      <mc:AlternateContent xmlns:mc="http://schemas.openxmlformats.org/markup-compatibility/2006">
-        <mc:Choice xmlns:p14="http://schemas.microsoft.com/office/powerpoint/2010/main" Requires="p14">
+      <mc:AlternateContent xmlns:mc="http://schemas.openxmlformats.org/markup-compatibility/2006" xmlns:p14="http://schemas.microsoft.com/office/powerpoint/2010/main">
+        <mc:Choice Requires="p14">
           <p:contentPart p14:bwMode="auto" r:id="rId75">
             <p14:nvContentPartPr>
               <p14:cNvPr id="77" name="Ink 76">
@@ -14577,7 +14577,7 @@
             </p14:xfrm>
           </p:contentPart>
         </mc:Choice>
-        <mc:Fallback>
+        <mc:Fallback xmlns="">
           <p:pic>
             <p:nvPicPr>
               <p:cNvPr id="77" name="Ink 76">
@@ -14608,8 +14608,8 @@
           </p:pic>
         </mc:Fallback>
       </mc:AlternateContent>
-      <mc:AlternateContent xmlns:mc="http://schemas.openxmlformats.org/markup-compatibility/2006">
-        <mc:Choice xmlns:p14="http://schemas.microsoft.com/office/powerpoint/2010/main" Requires="p14">
+      <mc:AlternateContent xmlns:mc="http://schemas.openxmlformats.org/markup-compatibility/2006" xmlns:p14="http://schemas.microsoft.com/office/powerpoint/2010/main">
+        <mc:Choice Requires="p14">
           <p:contentPart p14:bwMode="auto" r:id="rId77">
             <p14:nvContentPartPr>
               <p14:cNvPr id="81" name="Ink 80">
@@ -14628,7 +14628,7 @@
             </p14:xfrm>
           </p:contentPart>
         </mc:Choice>
-        <mc:Fallback>
+        <mc:Fallback xmlns="">
           <p:pic>
             <p:nvPicPr>
               <p:cNvPr id="81" name="Ink 80">
@@ -14659,8 +14659,8 @@
           </p:pic>
         </mc:Fallback>
       </mc:AlternateContent>
-      <mc:AlternateContent xmlns:mc="http://schemas.openxmlformats.org/markup-compatibility/2006">
-        <mc:Choice xmlns:p14="http://schemas.microsoft.com/office/powerpoint/2010/main" Requires="p14">
+      <mc:AlternateContent xmlns:mc="http://schemas.openxmlformats.org/markup-compatibility/2006" xmlns:p14="http://schemas.microsoft.com/office/powerpoint/2010/main">
+        <mc:Choice Requires="p14">
           <p:contentPart p14:bwMode="auto" r:id="rId79">
             <p14:nvContentPartPr>
               <p14:cNvPr id="82" name="Ink 81">
@@ -14679,7 +14679,7 @@
             </p14:xfrm>
           </p:contentPart>
         </mc:Choice>
-        <mc:Fallback>
+        <mc:Fallback xmlns="">
           <p:pic>
             <p:nvPicPr>
               <p:cNvPr id="82" name="Ink 81">
@@ -14710,8 +14710,8 @@
           </p:pic>
         </mc:Fallback>
       </mc:AlternateContent>
-      <mc:AlternateContent xmlns:mc="http://schemas.openxmlformats.org/markup-compatibility/2006">
-        <mc:Choice xmlns:p14="http://schemas.microsoft.com/office/powerpoint/2010/main" Requires="p14">
+      <mc:AlternateContent xmlns:mc="http://schemas.openxmlformats.org/markup-compatibility/2006" xmlns:p14="http://schemas.microsoft.com/office/powerpoint/2010/main">
+        <mc:Choice Requires="p14">
           <p:contentPart p14:bwMode="auto" r:id="rId81">
             <p14:nvContentPartPr>
               <p14:cNvPr id="86" name="Ink 85">
@@ -14730,7 +14730,7 @@
             </p14:xfrm>
           </p:contentPart>
         </mc:Choice>
-        <mc:Fallback>
+        <mc:Fallback xmlns="">
           <p:pic>
             <p:nvPicPr>
               <p:cNvPr id="86" name="Ink 85">
@@ -14761,8 +14761,8 @@
           </p:pic>
         </mc:Fallback>
       </mc:AlternateContent>
-      <mc:AlternateContent xmlns:mc="http://schemas.openxmlformats.org/markup-compatibility/2006">
-        <mc:Choice xmlns:p14="http://schemas.microsoft.com/office/powerpoint/2010/main" Requires="p14">
+      <mc:AlternateContent xmlns:mc="http://schemas.openxmlformats.org/markup-compatibility/2006" xmlns:p14="http://schemas.microsoft.com/office/powerpoint/2010/main">
+        <mc:Choice Requires="p14">
           <p:contentPart p14:bwMode="auto" r:id="rId83">
             <p14:nvContentPartPr>
               <p14:cNvPr id="87" name="Ink 86">
@@ -14781,7 +14781,7 @@
             </p14:xfrm>
           </p:contentPart>
         </mc:Choice>
-        <mc:Fallback>
+        <mc:Fallback xmlns="">
           <p:pic>
             <p:nvPicPr>
               <p:cNvPr id="87" name="Ink 86">
@@ -14812,8 +14812,8 @@
           </p:pic>
         </mc:Fallback>
       </mc:AlternateContent>
-      <mc:AlternateContent xmlns:mc="http://schemas.openxmlformats.org/markup-compatibility/2006">
-        <mc:Choice xmlns:p14="http://schemas.microsoft.com/office/powerpoint/2010/main" Requires="p14">
+      <mc:AlternateContent xmlns:mc="http://schemas.openxmlformats.org/markup-compatibility/2006" xmlns:p14="http://schemas.microsoft.com/office/powerpoint/2010/main">
+        <mc:Choice Requires="p14">
           <p:contentPart p14:bwMode="auto" r:id="rId85">
             <p14:nvContentPartPr>
               <p14:cNvPr id="88" name="Ink 87">
@@ -14832,7 +14832,7 @@
             </p14:xfrm>
           </p:contentPart>
         </mc:Choice>
-        <mc:Fallback>
+        <mc:Fallback xmlns="">
           <p:pic>
             <p:nvPicPr>
               <p:cNvPr id="88" name="Ink 87">
@@ -14863,8 +14863,8 @@
           </p:pic>
         </mc:Fallback>
       </mc:AlternateContent>
-      <mc:AlternateContent xmlns:mc="http://schemas.openxmlformats.org/markup-compatibility/2006">
-        <mc:Choice xmlns:p14="http://schemas.microsoft.com/office/powerpoint/2010/main" Requires="p14">
+      <mc:AlternateContent xmlns:mc="http://schemas.openxmlformats.org/markup-compatibility/2006" xmlns:p14="http://schemas.microsoft.com/office/powerpoint/2010/main">
+        <mc:Choice Requires="p14">
           <p:contentPart p14:bwMode="auto" r:id="rId87">
             <p14:nvContentPartPr>
               <p14:cNvPr id="25" name="Ink 24">
@@ -14883,7 +14883,7 @@
             </p14:xfrm>
           </p:contentPart>
         </mc:Choice>
-        <mc:Fallback>
+        <mc:Fallback xmlns="">
           <p:pic>
             <p:nvPicPr>
               <p:cNvPr id="25" name="Ink 24">
@@ -14914,8 +14914,8 @@
           </p:pic>
         </mc:Fallback>
       </mc:AlternateContent>
-      <mc:AlternateContent xmlns:mc="http://schemas.openxmlformats.org/markup-compatibility/2006">
-        <mc:Choice xmlns:p14="http://schemas.microsoft.com/office/powerpoint/2010/main" Requires="p14">
+      <mc:AlternateContent xmlns:mc="http://schemas.openxmlformats.org/markup-compatibility/2006" xmlns:p14="http://schemas.microsoft.com/office/powerpoint/2010/main">
+        <mc:Choice Requires="p14">
           <p:contentPart p14:bwMode="auto" r:id="rId89">
             <p14:nvContentPartPr>
               <p14:cNvPr id="26" name="Ink 25">
@@ -14934,7 +14934,7 @@
             </p14:xfrm>
           </p:contentPart>
         </mc:Choice>
-        <mc:Fallback>
+        <mc:Fallback xmlns="">
           <p:pic>
             <p:nvPicPr>
               <p:cNvPr id="26" name="Ink 25">
@@ -14965,8 +14965,8 @@
           </p:pic>
         </mc:Fallback>
       </mc:AlternateContent>
-      <mc:AlternateContent xmlns:mc="http://schemas.openxmlformats.org/markup-compatibility/2006">
-        <mc:Choice xmlns:p14="http://schemas.microsoft.com/office/powerpoint/2010/main" Requires="p14">
+      <mc:AlternateContent xmlns:mc="http://schemas.openxmlformats.org/markup-compatibility/2006" xmlns:p14="http://schemas.microsoft.com/office/powerpoint/2010/main">
+        <mc:Choice Requires="p14">
           <p:contentPart p14:bwMode="auto" r:id="rId91">
             <p14:nvContentPartPr>
               <p14:cNvPr id="28" name="Ink 27">
@@ -14985,7 +14985,7 @@
             </p14:xfrm>
           </p:contentPart>
         </mc:Choice>
-        <mc:Fallback>
+        <mc:Fallback xmlns="">
           <p:pic>
             <p:nvPicPr>
               <p:cNvPr id="28" name="Ink 27">
@@ -15016,8 +15016,8 @@
           </p:pic>
         </mc:Fallback>
       </mc:AlternateContent>
-      <mc:AlternateContent xmlns:mc="http://schemas.openxmlformats.org/markup-compatibility/2006">
-        <mc:Choice xmlns:p14="http://schemas.microsoft.com/office/powerpoint/2010/main" Requires="p14">
+      <mc:AlternateContent xmlns:mc="http://schemas.openxmlformats.org/markup-compatibility/2006" xmlns:p14="http://schemas.microsoft.com/office/powerpoint/2010/main">
+        <mc:Choice Requires="p14">
           <p:contentPart p14:bwMode="auto" r:id="rId93">
             <p14:nvContentPartPr>
               <p14:cNvPr id="29" name="Ink 28">
@@ -15036,7 +15036,7 @@
             </p14:xfrm>
           </p:contentPart>
         </mc:Choice>
-        <mc:Fallback>
+        <mc:Fallback xmlns="">
           <p:pic>
             <p:nvPicPr>
               <p:cNvPr id="29" name="Ink 28">
@@ -15067,8 +15067,8 @@
           </p:pic>
         </mc:Fallback>
       </mc:AlternateContent>
-      <mc:AlternateContent xmlns:mc="http://schemas.openxmlformats.org/markup-compatibility/2006">
-        <mc:Choice xmlns:p14="http://schemas.microsoft.com/office/powerpoint/2010/main" Requires="p14">
+      <mc:AlternateContent xmlns:mc="http://schemas.openxmlformats.org/markup-compatibility/2006" xmlns:p14="http://schemas.microsoft.com/office/powerpoint/2010/main">
+        <mc:Choice Requires="p14">
           <p:contentPart p14:bwMode="auto" r:id="rId95">
             <p14:nvContentPartPr>
               <p14:cNvPr id="31" name="Ink 30">
@@ -15087,7 +15087,7 @@
             </p14:xfrm>
           </p:contentPart>
         </mc:Choice>
-        <mc:Fallback>
+        <mc:Fallback xmlns="">
           <p:pic>
             <p:nvPicPr>
               <p:cNvPr id="31" name="Ink 30">
@@ -15118,8 +15118,8 @@
           </p:pic>
         </mc:Fallback>
       </mc:AlternateContent>
-      <mc:AlternateContent xmlns:mc="http://schemas.openxmlformats.org/markup-compatibility/2006">
-        <mc:Choice xmlns:p14="http://schemas.microsoft.com/office/powerpoint/2010/main" Requires="p14">
+      <mc:AlternateContent xmlns:mc="http://schemas.openxmlformats.org/markup-compatibility/2006" xmlns:p14="http://schemas.microsoft.com/office/powerpoint/2010/main">
+        <mc:Choice Requires="p14">
           <p:contentPart p14:bwMode="auto" r:id="rId97">
             <p14:nvContentPartPr>
               <p14:cNvPr id="32" name="Ink 31">
@@ -15138,7 +15138,7 @@
             </p14:xfrm>
           </p:contentPart>
         </mc:Choice>
-        <mc:Fallback>
+        <mc:Fallback xmlns="">
           <p:pic>
             <p:nvPicPr>
               <p:cNvPr id="32" name="Ink 31">
@@ -15169,8 +15169,8 @@
           </p:pic>
         </mc:Fallback>
       </mc:AlternateContent>
-      <mc:AlternateContent xmlns:mc="http://schemas.openxmlformats.org/markup-compatibility/2006">
-        <mc:Choice xmlns:p14="http://schemas.microsoft.com/office/powerpoint/2010/main" Requires="p14">
+      <mc:AlternateContent xmlns:mc="http://schemas.openxmlformats.org/markup-compatibility/2006" xmlns:p14="http://schemas.microsoft.com/office/powerpoint/2010/main">
+        <mc:Choice Requires="p14">
           <p:contentPart p14:bwMode="auto" r:id="rId99">
             <p14:nvContentPartPr>
               <p14:cNvPr id="33" name="Ink 32">
@@ -15189,7 +15189,7 @@
             </p14:xfrm>
           </p:contentPart>
         </mc:Choice>
-        <mc:Fallback>
+        <mc:Fallback xmlns="">
           <p:pic>
             <p:nvPicPr>
               <p:cNvPr id="33" name="Ink 32">
@@ -15220,8 +15220,8 @@
           </p:pic>
         </mc:Fallback>
       </mc:AlternateContent>
-      <mc:AlternateContent xmlns:mc="http://schemas.openxmlformats.org/markup-compatibility/2006">
-        <mc:Choice xmlns:p14="http://schemas.microsoft.com/office/powerpoint/2010/main" Requires="p14">
+      <mc:AlternateContent xmlns:mc="http://schemas.openxmlformats.org/markup-compatibility/2006" xmlns:p14="http://schemas.microsoft.com/office/powerpoint/2010/main">
+        <mc:Choice Requires="p14">
           <p:contentPart p14:bwMode="auto" r:id="rId101">
             <p14:nvContentPartPr>
               <p14:cNvPr id="34" name="Ink 33">
@@ -15240,7 +15240,7 @@
             </p14:xfrm>
           </p:contentPart>
         </mc:Choice>
-        <mc:Fallback>
+        <mc:Fallback xmlns="">
           <p:pic>
             <p:nvPicPr>
               <p:cNvPr id="34" name="Ink 33">
@@ -15271,8 +15271,8 @@
           </p:pic>
         </mc:Fallback>
       </mc:AlternateContent>
-      <mc:AlternateContent xmlns:mc="http://schemas.openxmlformats.org/markup-compatibility/2006">
-        <mc:Choice xmlns:p14="http://schemas.microsoft.com/office/powerpoint/2010/main" Requires="p14">
+      <mc:AlternateContent xmlns:mc="http://schemas.openxmlformats.org/markup-compatibility/2006" xmlns:p14="http://schemas.microsoft.com/office/powerpoint/2010/main">
+        <mc:Choice Requires="p14">
           <p:contentPart p14:bwMode="auto" r:id="rId103">
             <p14:nvContentPartPr>
               <p14:cNvPr id="36" name="Ink 35">
@@ -15291,7 +15291,7 @@
             </p14:xfrm>
           </p:contentPart>
         </mc:Choice>
-        <mc:Fallback>
+        <mc:Fallback xmlns="">
           <p:pic>
             <p:nvPicPr>
               <p:cNvPr id="36" name="Ink 35">
@@ -15322,8 +15322,8 @@
           </p:pic>
         </mc:Fallback>
       </mc:AlternateContent>
-      <mc:AlternateContent xmlns:mc="http://schemas.openxmlformats.org/markup-compatibility/2006">
-        <mc:Choice xmlns:p14="http://schemas.microsoft.com/office/powerpoint/2010/main" Requires="p14">
+      <mc:AlternateContent xmlns:mc="http://schemas.openxmlformats.org/markup-compatibility/2006" xmlns:p14="http://schemas.microsoft.com/office/powerpoint/2010/main">
+        <mc:Choice Requires="p14">
           <p:contentPart p14:bwMode="auto" r:id="rId105">
             <p14:nvContentPartPr>
               <p14:cNvPr id="37" name="Ink 36">
@@ -15342,7 +15342,7 @@
             </p14:xfrm>
           </p:contentPart>
         </mc:Choice>
-        <mc:Fallback>
+        <mc:Fallback xmlns="">
           <p:pic>
             <p:nvPicPr>
               <p:cNvPr id="37" name="Ink 36">
@@ -15373,8 +15373,8 @@
           </p:pic>
         </mc:Fallback>
       </mc:AlternateContent>
-      <mc:AlternateContent xmlns:mc="http://schemas.openxmlformats.org/markup-compatibility/2006">
-        <mc:Choice xmlns:p14="http://schemas.microsoft.com/office/powerpoint/2010/main" Requires="p14">
+      <mc:AlternateContent xmlns:mc="http://schemas.openxmlformats.org/markup-compatibility/2006" xmlns:p14="http://schemas.microsoft.com/office/powerpoint/2010/main">
+        <mc:Choice Requires="p14">
           <p:contentPart p14:bwMode="auto" r:id="rId107">
             <p14:nvContentPartPr>
               <p14:cNvPr id="96" name="Ink 95">
@@ -15393,7 +15393,7 @@
             </p14:xfrm>
           </p:contentPart>
         </mc:Choice>
-        <mc:Fallback>
+        <mc:Fallback xmlns="">
           <p:pic>
             <p:nvPicPr>
               <p:cNvPr id="96" name="Ink 95">
@@ -15444,8 +15444,8 @@
             <a:chExt cx="1176120" cy="1121760"/>
           </a:xfrm>
         </p:grpSpPr>
-        <mc:AlternateContent xmlns:mc="http://schemas.openxmlformats.org/markup-compatibility/2006">
-          <mc:Choice xmlns:p14="http://schemas.microsoft.com/office/powerpoint/2010/main" Requires="p14">
+        <mc:AlternateContent xmlns:mc="http://schemas.openxmlformats.org/markup-compatibility/2006" xmlns:p14="http://schemas.microsoft.com/office/powerpoint/2010/main">
+          <mc:Choice Requires="p14">
             <p:contentPart p14:bwMode="auto" r:id="rId109">
               <p14:nvContentPartPr>
                 <p14:cNvPr id="78" name="Ink 77">
@@ -15464,7 +15464,7 @@
               </p14:xfrm>
             </p:contentPart>
           </mc:Choice>
-          <mc:Fallback>
+          <mc:Fallback xmlns="">
             <p:pic>
               <p:nvPicPr>
                 <p:cNvPr id="78" name="Ink 77">
@@ -15495,8 +15495,8 @@
             </p:pic>
           </mc:Fallback>
         </mc:AlternateContent>
-        <mc:AlternateContent xmlns:mc="http://schemas.openxmlformats.org/markup-compatibility/2006">
-          <mc:Choice xmlns:p14="http://schemas.microsoft.com/office/powerpoint/2010/main" Requires="p14">
+        <mc:AlternateContent xmlns:mc="http://schemas.openxmlformats.org/markup-compatibility/2006" xmlns:p14="http://schemas.microsoft.com/office/powerpoint/2010/main">
+          <mc:Choice Requires="p14">
             <p:contentPart p14:bwMode="auto" r:id="rId111">
               <p14:nvContentPartPr>
                 <p14:cNvPr id="79" name="Ink 78">
@@ -15515,7 +15515,7 @@
               </p14:xfrm>
             </p:contentPart>
           </mc:Choice>
-          <mc:Fallback>
+          <mc:Fallback xmlns="">
             <p:pic>
               <p:nvPicPr>
                 <p:cNvPr id="79" name="Ink 78">
@@ -15546,8 +15546,8 @@
             </p:pic>
           </mc:Fallback>
         </mc:AlternateContent>
-        <mc:AlternateContent xmlns:mc="http://schemas.openxmlformats.org/markup-compatibility/2006">
-          <mc:Choice xmlns:p14="http://schemas.microsoft.com/office/powerpoint/2010/main" Requires="p14">
+        <mc:AlternateContent xmlns:mc="http://schemas.openxmlformats.org/markup-compatibility/2006" xmlns:p14="http://schemas.microsoft.com/office/powerpoint/2010/main">
+          <mc:Choice Requires="p14">
             <p:contentPart p14:bwMode="auto" r:id="rId113">
               <p14:nvContentPartPr>
                 <p14:cNvPr id="100" name="Ink 99">
@@ -15566,7 +15566,7 @@
               </p14:xfrm>
             </p:contentPart>
           </mc:Choice>
-          <mc:Fallback>
+          <mc:Fallback xmlns="">
             <p:pic>
               <p:nvPicPr>
                 <p:cNvPr id="100" name="Ink 99">
@@ -15597,8 +15597,8 @@
             </p:pic>
           </mc:Fallback>
         </mc:AlternateContent>
-        <mc:AlternateContent xmlns:mc="http://schemas.openxmlformats.org/markup-compatibility/2006">
-          <mc:Choice xmlns:p14="http://schemas.microsoft.com/office/powerpoint/2010/main" Requires="p14">
+        <mc:AlternateContent xmlns:mc="http://schemas.openxmlformats.org/markup-compatibility/2006" xmlns:p14="http://schemas.microsoft.com/office/powerpoint/2010/main">
+          <mc:Choice Requires="p14">
             <p:contentPart p14:bwMode="auto" r:id="rId115">
               <p14:nvContentPartPr>
                 <p14:cNvPr id="105" name="Ink 104">
@@ -15617,7 +15617,7 @@
               </p14:xfrm>
             </p:contentPart>
           </mc:Choice>
-          <mc:Fallback>
+          <mc:Fallback xmlns="">
             <p:pic>
               <p:nvPicPr>
                 <p:cNvPr id="105" name="Ink 104">
@@ -15669,8 +15669,8 @@
             <a:chExt cx="4446720" cy="2972348"/>
           </a:xfrm>
         </p:grpSpPr>
-        <mc:AlternateContent xmlns:mc="http://schemas.openxmlformats.org/markup-compatibility/2006">
-          <mc:Choice xmlns:p14="http://schemas.microsoft.com/office/powerpoint/2010/main" Requires="p14">
+        <mc:AlternateContent xmlns:mc="http://schemas.openxmlformats.org/markup-compatibility/2006" xmlns:p14="http://schemas.microsoft.com/office/powerpoint/2010/main">
+          <mc:Choice Requires="p14">
             <p:contentPart p14:bwMode="auto" r:id="rId117">
               <p14:nvContentPartPr>
                 <p14:cNvPr id="39" name="Ink 38">
@@ -15689,7 +15689,7 @@
               </p14:xfrm>
             </p:contentPart>
           </mc:Choice>
-          <mc:Fallback>
+          <mc:Fallback xmlns="">
             <p:pic>
               <p:nvPicPr>
                 <p:cNvPr id="39" name="Ink 38">
@@ -15720,8 +15720,8 @@
             </p:pic>
           </mc:Fallback>
         </mc:AlternateContent>
-        <mc:AlternateContent xmlns:mc="http://schemas.openxmlformats.org/markup-compatibility/2006">
-          <mc:Choice xmlns:p14="http://schemas.microsoft.com/office/powerpoint/2010/main" Requires="p14">
+        <mc:AlternateContent xmlns:mc="http://schemas.openxmlformats.org/markup-compatibility/2006" xmlns:p14="http://schemas.microsoft.com/office/powerpoint/2010/main">
+          <mc:Choice Requires="p14">
             <p:contentPart p14:bwMode="auto" r:id="rId119">
               <p14:nvContentPartPr>
                 <p14:cNvPr id="40" name="Ink 39">
@@ -15740,7 +15740,7 @@
               </p14:xfrm>
             </p:contentPart>
           </mc:Choice>
-          <mc:Fallback>
+          <mc:Fallback xmlns="">
             <p:pic>
               <p:nvPicPr>
                 <p:cNvPr id="40" name="Ink 39">
@@ -15771,8 +15771,8 @@
             </p:pic>
           </mc:Fallback>
         </mc:AlternateContent>
-        <mc:AlternateContent xmlns:mc="http://schemas.openxmlformats.org/markup-compatibility/2006">
-          <mc:Choice xmlns:p14="http://schemas.microsoft.com/office/powerpoint/2010/main" Requires="p14">
+        <mc:AlternateContent xmlns:mc="http://schemas.openxmlformats.org/markup-compatibility/2006" xmlns:p14="http://schemas.microsoft.com/office/powerpoint/2010/main">
+          <mc:Choice Requires="p14">
             <p:contentPart p14:bwMode="auto" r:id="rId121">
               <p14:nvContentPartPr>
                 <p14:cNvPr id="41" name="Ink 40">
@@ -15791,7 +15791,7 @@
               </p14:xfrm>
             </p:contentPart>
           </mc:Choice>
-          <mc:Fallback>
+          <mc:Fallback xmlns="">
             <p:pic>
               <p:nvPicPr>
                 <p:cNvPr id="41" name="Ink 40">
@@ -15822,8 +15822,8 @@
             </p:pic>
           </mc:Fallback>
         </mc:AlternateContent>
-        <mc:AlternateContent xmlns:mc="http://schemas.openxmlformats.org/markup-compatibility/2006">
-          <mc:Choice xmlns:p14="http://schemas.microsoft.com/office/powerpoint/2010/main" Requires="p14">
+        <mc:AlternateContent xmlns:mc="http://schemas.openxmlformats.org/markup-compatibility/2006" xmlns:p14="http://schemas.microsoft.com/office/powerpoint/2010/main">
+          <mc:Choice Requires="p14">
             <p:contentPart p14:bwMode="auto" r:id="rId123">
               <p14:nvContentPartPr>
                 <p14:cNvPr id="42" name="Ink 41">
@@ -15842,7 +15842,7 @@
               </p14:xfrm>
             </p:contentPart>
           </mc:Choice>
-          <mc:Fallback>
+          <mc:Fallback xmlns="">
             <p:pic>
               <p:nvPicPr>
                 <p:cNvPr id="42" name="Ink 41">
@@ -15873,8 +15873,8 @@
             </p:pic>
           </mc:Fallback>
         </mc:AlternateContent>
-        <mc:AlternateContent xmlns:mc="http://schemas.openxmlformats.org/markup-compatibility/2006">
-          <mc:Choice xmlns:p14="http://schemas.microsoft.com/office/powerpoint/2010/main" Requires="p14">
+        <mc:AlternateContent xmlns:mc="http://schemas.openxmlformats.org/markup-compatibility/2006" xmlns:p14="http://schemas.microsoft.com/office/powerpoint/2010/main">
+          <mc:Choice Requires="p14">
             <p:contentPart p14:bwMode="auto" r:id="rId125">
               <p14:nvContentPartPr>
                 <p14:cNvPr id="43" name="Ink 42">
@@ -15893,7 +15893,7 @@
               </p14:xfrm>
             </p:contentPart>
           </mc:Choice>
-          <mc:Fallback>
+          <mc:Fallback xmlns="">
             <p:pic>
               <p:nvPicPr>
                 <p:cNvPr id="43" name="Ink 42">
@@ -15924,8 +15924,8 @@
             </p:pic>
           </mc:Fallback>
         </mc:AlternateContent>
-        <mc:AlternateContent xmlns:mc="http://schemas.openxmlformats.org/markup-compatibility/2006">
-          <mc:Choice xmlns:p14="http://schemas.microsoft.com/office/powerpoint/2010/main" Requires="p14">
+        <mc:AlternateContent xmlns:mc="http://schemas.openxmlformats.org/markup-compatibility/2006" xmlns:p14="http://schemas.microsoft.com/office/powerpoint/2010/main">
+          <mc:Choice Requires="p14">
             <p:contentPart p14:bwMode="auto" r:id="rId127">
               <p14:nvContentPartPr>
                 <p14:cNvPr id="45" name="Ink 44">
@@ -15944,7 +15944,7 @@
               </p14:xfrm>
             </p:contentPart>
           </mc:Choice>
-          <mc:Fallback>
+          <mc:Fallback xmlns="">
             <p:pic>
               <p:nvPicPr>
                 <p:cNvPr id="45" name="Ink 44">
@@ -15975,8 +15975,8 @@
             </p:pic>
           </mc:Fallback>
         </mc:AlternateContent>
-        <mc:AlternateContent xmlns:mc="http://schemas.openxmlformats.org/markup-compatibility/2006">
-          <mc:Choice xmlns:p14="http://schemas.microsoft.com/office/powerpoint/2010/main" Requires="p14">
+        <mc:AlternateContent xmlns:mc="http://schemas.openxmlformats.org/markup-compatibility/2006" xmlns:p14="http://schemas.microsoft.com/office/powerpoint/2010/main">
+          <mc:Choice Requires="p14">
             <p:contentPart p14:bwMode="auto" r:id="rId129">
               <p14:nvContentPartPr>
                 <p14:cNvPr id="46" name="Ink 45">
@@ -15995,7 +15995,7 @@
               </p14:xfrm>
             </p:contentPart>
           </mc:Choice>
-          <mc:Fallback>
+          <mc:Fallback xmlns="">
             <p:pic>
               <p:nvPicPr>
                 <p:cNvPr id="46" name="Ink 45">
@@ -16026,8 +16026,8 @@
             </p:pic>
           </mc:Fallback>
         </mc:AlternateContent>
-        <mc:AlternateContent xmlns:mc="http://schemas.openxmlformats.org/markup-compatibility/2006">
-          <mc:Choice xmlns:p14="http://schemas.microsoft.com/office/powerpoint/2010/main" Requires="p14">
+        <mc:AlternateContent xmlns:mc="http://schemas.openxmlformats.org/markup-compatibility/2006" xmlns:p14="http://schemas.microsoft.com/office/powerpoint/2010/main">
+          <mc:Choice Requires="p14">
             <p:contentPart p14:bwMode="auto" r:id="rId131">
               <p14:nvContentPartPr>
                 <p14:cNvPr id="47" name="Ink 46">
@@ -16046,7 +16046,7 @@
               </p14:xfrm>
             </p:contentPart>
           </mc:Choice>
-          <mc:Fallback>
+          <mc:Fallback xmlns="">
             <p:pic>
               <p:nvPicPr>
                 <p:cNvPr id="47" name="Ink 46">
@@ -16077,8 +16077,8 @@
             </p:pic>
           </mc:Fallback>
         </mc:AlternateContent>
-        <mc:AlternateContent xmlns:mc="http://schemas.openxmlformats.org/markup-compatibility/2006">
-          <mc:Choice xmlns:p14="http://schemas.microsoft.com/office/powerpoint/2010/main" Requires="p14">
+        <mc:AlternateContent xmlns:mc="http://schemas.openxmlformats.org/markup-compatibility/2006" xmlns:p14="http://schemas.microsoft.com/office/powerpoint/2010/main">
+          <mc:Choice Requires="p14">
             <p:contentPart p14:bwMode="auto" r:id="rId133">
               <p14:nvContentPartPr>
                 <p14:cNvPr id="49" name="Ink 48">
@@ -16097,7 +16097,7 @@
               </p14:xfrm>
             </p:contentPart>
           </mc:Choice>
-          <mc:Fallback>
+          <mc:Fallback xmlns="">
             <p:pic>
               <p:nvPicPr>
                 <p:cNvPr id="49" name="Ink 48">
@@ -16128,8 +16128,8 @@
             </p:pic>
           </mc:Fallback>
         </mc:AlternateContent>
-        <mc:AlternateContent xmlns:mc="http://schemas.openxmlformats.org/markup-compatibility/2006">
-          <mc:Choice xmlns:p14="http://schemas.microsoft.com/office/powerpoint/2010/main" Requires="p14">
+        <mc:AlternateContent xmlns:mc="http://schemas.openxmlformats.org/markup-compatibility/2006" xmlns:p14="http://schemas.microsoft.com/office/powerpoint/2010/main">
+          <mc:Choice Requires="p14">
             <p:contentPart p14:bwMode="auto" r:id="rId135">
               <p14:nvContentPartPr>
                 <p14:cNvPr id="50" name="Ink 49">
@@ -16148,7 +16148,7 @@
               </p14:xfrm>
             </p:contentPart>
           </mc:Choice>
-          <mc:Fallback>
+          <mc:Fallback xmlns="">
             <p:pic>
               <p:nvPicPr>
                 <p:cNvPr id="50" name="Ink 49">
@@ -16179,8 +16179,8 @@
             </p:pic>
           </mc:Fallback>
         </mc:AlternateContent>
-        <mc:AlternateContent xmlns:mc="http://schemas.openxmlformats.org/markup-compatibility/2006">
-          <mc:Choice xmlns:p14="http://schemas.microsoft.com/office/powerpoint/2010/main" Requires="p14">
+        <mc:AlternateContent xmlns:mc="http://schemas.openxmlformats.org/markup-compatibility/2006" xmlns:p14="http://schemas.microsoft.com/office/powerpoint/2010/main">
+          <mc:Choice Requires="p14">
             <p:contentPart p14:bwMode="auto" r:id="rId137">
               <p14:nvContentPartPr>
                 <p14:cNvPr id="52" name="Ink 51">
@@ -16199,7 +16199,7 @@
               </p14:xfrm>
             </p:contentPart>
           </mc:Choice>
-          <mc:Fallback>
+          <mc:Fallback xmlns="">
             <p:pic>
               <p:nvPicPr>
                 <p:cNvPr id="52" name="Ink 51">
@@ -16230,8 +16230,8 @@
             </p:pic>
           </mc:Fallback>
         </mc:AlternateContent>
-        <mc:AlternateContent xmlns:mc="http://schemas.openxmlformats.org/markup-compatibility/2006">
-          <mc:Choice xmlns:p14="http://schemas.microsoft.com/office/powerpoint/2010/main" Requires="p14">
+        <mc:AlternateContent xmlns:mc="http://schemas.openxmlformats.org/markup-compatibility/2006" xmlns:p14="http://schemas.microsoft.com/office/powerpoint/2010/main">
+          <mc:Choice Requires="p14">
             <p:contentPart p14:bwMode="auto" r:id="rId139">
               <p14:nvContentPartPr>
                 <p14:cNvPr id="53" name="Ink 52">
@@ -16250,7 +16250,7 @@
               </p14:xfrm>
             </p:contentPart>
           </mc:Choice>
-          <mc:Fallback>
+          <mc:Fallback xmlns="">
             <p:pic>
               <p:nvPicPr>
                 <p:cNvPr id="53" name="Ink 52">
@@ -16281,8 +16281,8 @@
             </p:pic>
           </mc:Fallback>
         </mc:AlternateContent>
-        <mc:AlternateContent xmlns:mc="http://schemas.openxmlformats.org/markup-compatibility/2006">
-          <mc:Choice xmlns:p14="http://schemas.microsoft.com/office/powerpoint/2010/main" Requires="p14">
+        <mc:AlternateContent xmlns:mc="http://schemas.openxmlformats.org/markup-compatibility/2006" xmlns:p14="http://schemas.microsoft.com/office/powerpoint/2010/main">
+          <mc:Choice Requires="p14">
             <p:contentPart p14:bwMode="auto" r:id="rId141">
               <p14:nvContentPartPr>
                 <p14:cNvPr id="60" name="Ink 59">
@@ -16301,7 +16301,7 @@
               </p14:xfrm>
             </p:contentPart>
           </mc:Choice>
-          <mc:Fallback>
+          <mc:Fallback xmlns="">
             <p:pic>
               <p:nvPicPr>
                 <p:cNvPr id="60" name="Ink 59">
@@ -16332,8 +16332,8 @@
             </p:pic>
           </mc:Fallback>
         </mc:AlternateContent>
-        <mc:AlternateContent xmlns:mc="http://schemas.openxmlformats.org/markup-compatibility/2006">
-          <mc:Choice xmlns:p14="http://schemas.microsoft.com/office/powerpoint/2010/main" Requires="p14">
+        <mc:AlternateContent xmlns:mc="http://schemas.openxmlformats.org/markup-compatibility/2006" xmlns:p14="http://schemas.microsoft.com/office/powerpoint/2010/main">
+          <mc:Choice Requires="p14">
             <p:contentPart p14:bwMode="auto" r:id="rId143">
               <p14:nvContentPartPr>
                 <p14:cNvPr id="61" name="Ink 60">
@@ -16352,7 +16352,7 @@
               </p14:xfrm>
             </p:contentPart>
           </mc:Choice>
-          <mc:Fallback>
+          <mc:Fallback xmlns="">
             <p:pic>
               <p:nvPicPr>
                 <p:cNvPr id="61" name="Ink 60">
@@ -16383,8 +16383,8 @@
             </p:pic>
           </mc:Fallback>
         </mc:AlternateContent>
-        <mc:AlternateContent xmlns:mc="http://schemas.openxmlformats.org/markup-compatibility/2006">
-          <mc:Choice xmlns:p14="http://schemas.microsoft.com/office/powerpoint/2010/main" Requires="p14">
+        <mc:AlternateContent xmlns:mc="http://schemas.openxmlformats.org/markup-compatibility/2006" xmlns:p14="http://schemas.microsoft.com/office/powerpoint/2010/main">
+          <mc:Choice Requires="p14">
             <p:contentPart p14:bwMode="auto" r:id="rId145">
               <p14:nvContentPartPr>
                 <p14:cNvPr id="62" name="Ink 61">
@@ -16403,7 +16403,7 @@
               </p14:xfrm>
             </p:contentPart>
           </mc:Choice>
-          <mc:Fallback>
+          <mc:Fallback xmlns="">
             <p:pic>
               <p:nvPicPr>
                 <p:cNvPr id="62" name="Ink 61">
@@ -16434,8 +16434,8 @@
             </p:pic>
           </mc:Fallback>
         </mc:AlternateContent>
-        <mc:AlternateContent xmlns:mc="http://schemas.openxmlformats.org/markup-compatibility/2006">
-          <mc:Choice xmlns:p14="http://schemas.microsoft.com/office/powerpoint/2010/main" Requires="p14">
+        <mc:AlternateContent xmlns:mc="http://schemas.openxmlformats.org/markup-compatibility/2006" xmlns:p14="http://schemas.microsoft.com/office/powerpoint/2010/main">
+          <mc:Choice Requires="p14">
             <p:contentPart p14:bwMode="auto" r:id="rId147">
               <p14:nvContentPartPr>
                 <p14:cNvPr id="63" name="Ink 62">
@@ -16454,7 +16454,7 @@
               </p14:xfrm>
             </p:contentPart>
           </mc:Choice>
-          <mc:Fallback>
+          <mc:Fallback xmlns="">
             <p:pic>
               <p:nvPicPr>
                 <p:cNvPr id="63" name="Ink 62">
@@ -16485,8 +16485,8 @@
             </p:pic>
           </mc:Fallback>
         </mc:AlternateContent>
-        <mc:AlternateContent xmlns:mc="http://schemas.openxmlformats.org/markup-compatibility/2006">
-          <mc:Choice xmlns:p14="http://schemas.microsoft.com/office/powerpoint/2010/main" Requires="p14">
+        <mc:AlternateContent xmlns:mc="http://schemas.openxmlformats.org/markup-compatibility/2006" xmlns:p14="http://schemas.microsoft.com/office/powerpoint/2010/main">
+          <mc:Choice Requires="p14">
             <p:contentPart p14:bwMode="auto" r:id="rId149">
               <p14:nvContentPartPr>
                 <p14:cNvPr id="65" name="Ink 64">
@@ -16505,7 +16505,7 @@
               </p14:xfrm>
             </p:contentPart>
           </mc:Choice>
-          <mc:Fallback>
+          <mc:Fallback xmlns="">
             <p:pic>
               <p:nvPicPr>
                 <p:cNvPr id="65" name="Ink 64">
@@ -16536,8 +16536,8 @@
             </p:pic>
           </mc:Fallback>
         </mc:AlternateContent>
-        <mc:AlternateContent xmlns:mc="http://schemas.openxmlformats.org/markup-compatibility/2006">
-          <mc:Choice xmlns:p14="http://schemas.microsoft.com/office/powerpoint/2010/main" Requires="p14">
+        <mc:AlternateContent xmlns:mc="http://schemas.openxmlformats.org/markup-compatibility/2006" xmlns:p14="http://schemas.microsoft.com/office/powerpoint/2010/main">
+          <mc:Choice Requires="p14">
             <p:contentPart p14:bwMode="auto" r:id="rId151">
               <p14:nvContentPartPr>
                 <p14:cNvPr id="66" name="Ink 65">
@@ -16556,7 +16556,7 @@
               </p14:xfrm>
             </p:contentPart>
           </mc:Choice>
-          <mc:Fallback>
+          <mc:Fallback xmlns="">
             <p:pic>
               <p:nvPicPr>
                 <p:cNvPr id="66" name="Ink 65">
@@ -16587,8 +16587,8 @@
             </p:pic>
           </mc:Fallback>
         </mc:AlternateContent>
-        <mc:AlternateContent xmlns:mc="http://schemas.openxmlformats.org/markup-compatibility/2006">
-          <mc:Choice xmlns:p14="http://schemas.microsoft.com/office/powerpoint/2010/main" Requires="p14">
+        <mc:AlternateContent xmlns:mc="http://schemas.openxmlformats.org/markup-compatibility/2006" xmlns:p14="http://schemas.microsoft.com/office/powerpoint/2010/main">
+          <mc:Choice Requires="p14">
             <p:contentPart p14:bwMode="auto" r:id="rId153">
               <p14:nvContentPartPr>
                 <p14:cNvPr id="92" name="Ink 91">
@@ -16607,7 +16607,7 @@
               </p14:xfrm>
             </p:contentPart>
           </mc:Choice>
-          <mc:Fallback>
+          <mc:Fallback xmlns="">
             <p:pic>
               <p:nvPicPr>
                 <p:cNvPr id="92" name="Ink 91">
@@ -16638,8 +16638,8 @@
             </p:pic>
           </mc:Fallback>
         </mc:AlternateContent>
-        <mc:AlternateContent xmlns:mc="http://schemas.openxmlformats.org/markup-compatibility/2006">
-          <mc:Choice xmlns:p14="http://schemas.microsoft.com/office/powerpoint/2010/main" Requires="p14">
+        <mc:AlternateContent xmlns:mc="http://schemas.openxmlformats.org/markup-compatibility/2006" xmlns:p14="http://schemas.microsoft.com/office/powerpoint/2010/main">
+          <mc:Choice Requires="p14">
             <p:contentPart p14:bwMode="auto" r:id="rId155">
               <p14:nvContentPartPr>
                 <p14:cNvPr id="94" name="Ink 93">
@@ -16658,7 +16658,7 @@
               </p14:xfrm>
             </p:contentPart>
           </mc:Choice>
-          <mc:Fallback>
+          <mc:Fallback xmlns="">
             <p:pic>
               <p:nvPicPr>
                 <p:cNvPr id="94" name="Ink 93">
@@ -16689,8 +16689,8 @@
             </p:pic>
           </mc:Fallback>
         </mc:AlternateContent>
-        <mc:AlternateContent xmlns:mc="http://schemas.openxmlformats.org/markup-compatibility/2006">
-          <mc:Choice xmlns:p14="http://schemas.microsoft.com/office/powerpoint/2010/main" Requires="p14">
+        <mc:AlternateContent xmlns:mc="http://schemas.openxmlformats.org/markup-compatibility/2006" xmlns:p14="http://schemas.microsoft.com/office/powerpoint/2010/main">
+          <mc:Choice Requires="p14">
             <p:contentPart p14:bwMode="auto" r:id="rId157">
               <p14:nvContentPartPr>
                 <p14:cNvPr id="112" name="Ink 111">
@@ -16709,7 +16709,7 @@
               </p14:xfrm>
             </p:contentPart>
           </mc:Choice>
-          <mc:Fallback>
+          <mc:Fallback xmlns="">
             <p:pic>
               <p:nvPicPr>
                 <p:cNvPr id="112" name="Ink 111">
@@ -16740,8 +16740,8 @@
             </p:pic>
           </mc:Fallback>
         </mc:AlternateContent>
-        <mc:AlternateContent xmlns:mc="http://schemas.openxmlformats.org/markup-compatibility/2006">
-          <mc:Choice xmlns:p14="http://schemas.microsoft.com/office/powerpoint/2010/main" Requires="p14">
+        <mc:AlternateContent xmlns:mc="http://schemas.openxmlformats.org/markup-compatibility/2006" xmlns:p14="http://schemas.microsoft.com/office/powerpoint/2010/main">
+          <mc:Choice Requires="p14">
             <p:contentPart p14:bwMode="auto" r:id="rId159">
               <p14:nvContentPartPr>
                 <p14:cNvPr id="114" name="Ink 113">
@@ -16760,7 +16760,7 @@
               </p14:xfrm>
             </p:contentPart>
           </mc:Choice>
-          <mc:Fallback>
+          <mc:Fallback xmlns="">
             <p:pic>
               <p:nvPicPr>
                 <p:cNvPr id="114" name="Ink 113">

</xml_diff>